<commit_message>
Commit du ppt final
</commit_message>
<xml_diff>
--- a/Projet ArchiWeb.pptx
+++ b/Projet ArchiWeb.pptx
@@ -9554,8 +9554,8 @@
         </p:blipFill>
         <p:spPr>
           <a:xfrm>
-            <a:off x="786697" y="2420887"/>
-            <a:ext cx="7570606" cy="3539645"/>
+            <a:off x="1763688" y="2420888"/>
+            <a:ext cx="5904656" cy="3539645"/>
           </a:xfrm>
           <a:prstGeom prst="rect">
             <a:avLst/>

</xml_diff>